<commit_message>
Update to presentation file
</commit_message>
<xml_diff>
--- a/JavaScript Uint Testing.pptx
+++ b/JavaScript Uint Testing.pptx
@@ -7821,6 +7821,505 @@
           </a:p>
         </p:txBody>
       </p:sp>
+      <p:graphicFrame>
+        <p:nvGraphicFramePr>
+          <p:cNvPr id="5" name="Table 4"/>
+          <p:cNvGraphicFramePr>
+            <a:graphicFrameLocks noGrp="1"/>
+          </p:cNvGraphicFramePr>
+          <p:nvPr>
+            <p:extLst>
+              <p:ext uri="{D42A27DB-BD31-4B8C-83A1-F6EECF244321}">
+                <p14:modId xmlns:p14="http://schemas.microsoft.com/office/powerpoint/2010/main" val="1545767267"/>
+              </p:ext>
+            </p:extLst>
+          </p:nvPr>
+        </p:nvGraphicFramePr>
+        <p:xfrm>
+          <a:off x="707364" y="2611766"/>
+          <a:ext cx="9101788" cy="1676400"/>
+        </p:xfrm>
+        <a:graphic>
+          <a:graphicData uri="http://schemas.openxmlformats.org/drawingml/2006/table">
+            <a:tbl>
+              <a:tblPr>
+                <a:tableStyleId>{0E3FDE45-AF77-4B5C-9715-49D594BDF05E}</a:tableStyleId>
+              </a:tblPr>
+              <a:tblGrid>
+                <a:gridCol w="4550894"/>
+                <a:gridCol w="4550894"/>
+              </a:tblGrid>
+              <a:tr h="370840">
+                <a:tc>
+                  <a:txBody>
+                    <a:bodyPr/>
+                    <a:lstStyle/>
+                    <a:p>
+                      <a:r>
+                        <a:rPr lang="en-US" sz="1600" dirty="0" smtClean="0">
+                          <a:solidFill>
+                            <a:srgbClr val="FF0000"/>
+                          </a:solidFill>
+                          <a:latin typeface="Arial Rounded MT Bold"/>
+                          <a:cs typeface="Arial Rounded MT Bold"/>
+                        </a:rPr>
+                        <a:t>BAD:</a:t>
+                      </a:r>
+                      <a:r>
+                        <a:rPr lang="en-US" dirty="0" smtClean="0"/>
+                        <a:t/>
+                      </a:r>
+                      <a:br>
+                        <a:rPr lang="en-US" dirty="0" smtClean="0"/>
+                      </a:br>
+                      <a:r>
+                        <a:rPr lang="en-US" dirty="0" smtClean="0"/>
+                        <a:t/>
+                      </a:r>
+                      <a:br>
+                        <a:rPr lang="en-US" dirty="0" smtClean="0"/>
+                      </a:br>
+                      <a:r>
+                        <a:rPr lang="en-US" sz="1200" dirty="0" err="1" smtClean="0">
+                          <a:solidFill>
+                            <a:schemeClr val="bg1"/>
+                          </a:solidFill>
+                          <a:latin typeface="Andale Mono"/>
+                          <a:cs typeface="Andale Mono"/>
+                        </a:rPr>
+                        <a:t>var</a:t>
+                      </a:r>
+                      <a:r>
+                        <a:rPr lang="en-US" sz="1200" dirty="0" smtClean="0">
+                          <a:solidFill>
+                            <a:schemeClr val="bg1"/>
+                          </a:solidFill>
+                          <a:latin typeface="Andale Mono"/>
+                          <a:cs typeface="Andale Mono"/>
+                        </a:rPr>
+                        <a:t> numbers = [2,3,1,3,5];</a:t>
+                      </a:r>
+                    </a:p>
+                    <a:p>
+                      <a:r>
+                        <a:rPr lang="en-US" sz="1200" dirty="0" smtClean="0">
+                          <a:solidFill>
+                            <a:schemeClr val="bg1"/>
+                          </a:solidFill>
+                          <a:latin typeface="Andale Mono"/>
+                          <a:cs typeface="Andale Mono"/>
+                        </a:rPr>
+                        <a:t>$(‘</a:t>
+                      </a:r>
+                      <a:r>
+                        <a:rPr lang="en-US" sz="1200" dirty="0" err="1" smtClean="0">
+                          <a:solidFill>
+                            <a:schemeClr val="bg1"/>
+                          </a:solidFill>
+                          <a:latin typeface="Andale Mono"/>
+                          <a:cs typeface="Andale Mono"/>
+                        </a:rPr>
+                        <a:t>a.sort</a:t>
+                      </a:r>
+                      <a:r>
+                        <a:rPr lang="en-US" sz="1200" dirty="0" smtClean="0">
+                          <a:solidFill>
+                            <a:schemeClr val="bg1"/>
+                          </a:solidFill>
+                          <a:latin typeface="Andale Mono"/>
+                          <a:cs typeface="Andale Mono"/>
+                        </a:rPr>
+                        <a:t>-numbers’).on(‘click’, function(e){</a:t>
+                      </a:r>
+                      <a:br>
+                        <a:rPr lang="en-US" sz="1200" dirty="0" smtClean="0">
+                          <a:solidFill>
+                            <a:schemeClr val="bg1"/>
+                          </a:solidFill>
+                          <a:latin typeface="Andale Mono"/>
+                          <a:cs typeface="Andale Mono"/>
+                        </a:rPr>
+                      </a:br>
+                      <a:r>
+                        <a:rPr lang="en-US" sz="1200" dirty="0" smtClean="0">
+                          <a:solidFill>
+                            <a:schemeClr val="bg1"/>
+                          </a:solidFill>
+                          <a:latin typeface="Andale Mono"/>
+                          <a:cs typeface="Andale Mono"/>
+                        </a:rPr>
+                        <a:t>     </a:t>
+                      </a:r>
+                      <a:r>
+                        <a:rPr lang="en-US" sz="1200" dirty="0" err="1" smtClean="0">
+                          <a:solidFill>
+                            <a:schemeClr val="bg1"/>
+                          </a:solidFill>
+                          <a:latin typeface="Andale Mono"/>
+                          <a:cs typeface="Andale Mono"/>
+                        </a:rPr>
+                        <a:t>e.preventDefault</a:t>
+                      </a:r>
+                      <a:r>
+                        <a:rPr lang="en-US" sz="1200" dirty="0" smtClean="0">
+                          <a:solidFill>
+                            <a:schemeClr val="bg1"/>
+                          </a:solidFill>
+                          <a:latin typeface="Andale Mono"/>
+                          <a:cs typeface="Andale Mono"/>
+                        </a:rPr>
+                        <a:t>();</a:t>
+                      </a:r>
+                    </a:p>
+                    <a:p>
+                      <a:r>
+                        <a:rPr lang="en-US" sz="1200" dirty="0" smtClean="0">
+                          <a:solidFill>
+                            <a:schemeClr val="bg1"/>
+                          </a:solidFill>
+                          <a:latin typeface="Andale Mono"/>
+                          <a:cs typeface="Andale Mono"/>
+                        </a:rPr>
+                        <a:t>     </a:t>
+                      </a:r>
+                      <a:r>
+                        <a:rPr lang="en-US" sz="1200" dirty="0" err="1" smtClean="0">
+                          <a:solidFill>
+                            <a:schemeClr val="bg1"/>
+                          </a:solidFill>
+                          <a:latin typeface="Andale Mono"/>
+                          <a:cs typeface="Andale Mono"/>
+                        </a:rPr>
+                        <a:t>numbers.sort</a:t>
+                      </a:r>
+                      <a:r>
+                        <a:rPr lang="en-US" sz="1200" dirty="0" smtClean="0">
+                          <a:solidFill>
+                            <a:schemeClr val="bg1"/>
+                          </a:solidFill>
+                          <a:latin typeface="Andale Mono"/>
+                          <a:cs typeface="Andale Mono"/>
+                        </a:rPr>
+                        <a:t>();</a:t>
+                      </a:r>
+                    </a:p>
+                    <a:p>
+                      <a:r>
+                        <a:rPr lang="en-US" sz="1200" dirty="0" smtClean="0">
+                          <a:solidFill>
+                            <a:schemeClr val="bg1"/>
+                          </a:solidFill>
+                          <a:latin typeface="Andale Mono"/>
+                          <a:cs typeface="Andale Mono"/>
+                        </a:rPr>
+                        <a:t>});</a:t>
+                      </a:r>
+                      <a:endParaRPr lang="en-US" sz="1200" dirty="0">
+                        <a:solidFill>
+                          <a:schemeClr val="bg1"/>
+                        </a:solidFill>
+                        <a:latin typeface="Andale Mono"/>
+                        <a:cs typeface="Andale Mono"/>
+                      </a:endParaRPr>
+                    </a:p>
+                  </a:txBody>
+                  <a:tcPr>
+                    <a:lnL>
+                      <a:noFill/>
+                    </a:lnL>
+                    <a:lnR>
+                      <a:noFill/>
+                    </a:lnR>
+                    <a:lnT w="12700" cmpd="sng">
+                      <a:noFill/>
+                    </a:lnT>
+                    <a:lnB w="12700" cmpd="sng">
+                      <a:noFill/>
+                    </a:lnB>
+                    <a:lnTlToBr w="12700" cmpd="sng">
+                      <a:noFill/>
+                      <a:prstDash val="solid"/>
+                    </a:lnTlToBr>
+                    <a:lnBlToTr w="12700" cmpd="sng">
+                      <a:noFill/>
+                      <a:prstDash val="solid"/>
+                    </a:lnBlToTr>
+                  </a:tcPr>
+                </a:tc>
+                <a:tc>
+                  <a:txBody>
+                    <a:bodyPr/>
+                    <a:lstStyle/>
+                    <a:p>
+                      <a:r>
+                        <a:rPr lang="en-US" sz="1600" dirty="0" smtClean="0">
+                          <a:solidFill>
+                            <a:srgbClr val="387C2B"/>
+                          </a:solidFill>
+                          <a:latin typeface="Arial Rounded MT Bold"/>
+                          <a:cs typeface="Arial Rounded MT Bold"/>
+                        </a:rPr>
+                        <a:t>GOOD:</a:t>
+                      </a:r>
+                      <a:br>
+                        <a:rPr lang="en-US" sz="1600" dirty="0" smtClean="0">
+                          <a:solidFill>
+                            <a:srgbClr val="387C2B"/>
+                          </a:solidFill>
+                          <a:latin typeface="Arial Rounded MT Bold"/>
+                          <a:cs typeface="Arial Rounded MT Bold"/>
+                        </a:rPr>
+                      </a:br>
+                      <a:endParaRPr lang="en-US" sz="1600" dirty="0" smtClean="0">
+                        <a:solidFill>
+                          <a:srgbClr val="387C2B"/>
+                        </a:solidFill>
+                        <a:latin typeface="Arial Rounded MT Bold"/>
+                        <a:cs typeface="Arial Rounded MT Bold"/>
+                      </a:endParaRPr>
+                    </a:p>
+                    <a:p>
+                      <a:r>
+                        <a:rPr lang="en-US" sz="1200" dirty="0" err="1" smtClean="0">
+                          <a:solidFill>
+                            <a:srgbClr val="4D4D4D"/>
+                          </a:solidFill>
+                          <a:latin typeface="Andale Mono"/>
+                          <a:cs typeface="Andale Mono"/>
+                        </a:rPr>
+                        <a:t>var</a:t>
+                      </a:r>
+                      <a:r>
+                        <a:rPr lang="en-US" sz="1200" dirty="0" smtClean="0">
+                          <a:solidFill>
+                            <a:srgbClr val="4D4D4D"/>
+                          </a:solidFill>
+                          <a:latin typeface="Andale Mono"/>
+                          <a:cs typeface="Andale Mono"/>
+                        </a:rPr>
+                        <a:t> numbers = [2,3,1,3,5];</a:t>
+                      </a:r>
+                      <a:endParaRPr lang="en-US" sz="1200" dirty="0" smtClean="0">
+                        <a:solidFill>
+                          <a:srgbClr val="4D4D4D"/>
+                        </a:solidFill>
+                        <a:latin typeface="Andale Mono"/>
+                        <a:cs typeface="Andale Mono"/>
+                      </a:endParaRPr>
+                    </a:p>
+                    <a:p>
+                      <a:r>
+                        <a:rPr lang="en-US" sz="1200" dirty="0" err="1" smtClean="0">
+                          <a:solidFill>
+                            <a:srgbClr val="4D4D4D"/>
+                          </a:solidFill>
+                          <a:latin typeface="Andale Mono"/>
+                          <a:cs typeface="Andale Mono"/>
+                        </a:rPr>
+                        <a:t>var</a:t>
+                      </a:r>
+                      <a:r>
+                        <a:rPr lang="en-US" sz="1200" dirty="0" smtClean="0">
+                          <a:solidFill>
+                            <a:srgbClr val="4D4D4D"/>
+                          </a:solidFill>
+                          <a:latin typeface="Andale Mono"/>
+                          <a:cs typeface="Andale Mono"/>
+                        </a:rPr>
+                        <a:t> </a:t>
+                      </a:r>
+                      <a:r>
+                        <a:rPr lang="en-US" sz="1200" dirty="0" err="1" smtClean="0">
+                          <a:solidFill>
+                            <a:srgbClr val="4D4D4D"/>
+                          </a:solidFill>
+                          <a:latin typeface="Andale Mono"/>
+                          <a:cs typeface="Andale Mono"/>
+                        </a:rPr>
+                        <a:t>sortNumbers</a:t>
+                      </a:r>
+                      <a:r>
+                        <a:rPr lang="en-US" sz="1200" dirty="0" smtClean="0">
+                          <a:solidFill>
+                            <a:srgbClr val="4D4D4D"/>
+                          </a:solidFill>
+                          <a:latin typeface="Andale Mono"/>
+                          <a:cs typeface="Andale Mono"/>
+                        </a:rPr>
+                        <a:t> = function(e){</a:t>
+                      </a:r>
+                      <a:br>
+                        <a:rPr lang="en-US" sz="1200" dirty="0" smtClean="0">
+                          <a:solidFill>
+                            <a:srgbClr val="4D4D4D"/>
+                          </a:solidFill>
+                          <a:latin typeface="Andale Mono"/>
+                          <a:cs typeface="Andale Mono"/>
+                        </a:rPr>
+                      </a:br>
+                      <a:r>
+                        <a:rPr lang="en-US" sz="1200" dirty="0" smtClean="0">
+                          <a:solidFill>
+                            <a:srgbClr val="4D4D4D"/>
+                          </a:solidFill>
+                          <a:latin typeface="Andale Mono"/>
+                          <a:cs typeface="Andale Mono"/>
+                        </a:rPr>
+                        <a:t>     e &amp;&amp; </a:t>
+                      </a:r>
+                      <a:r>
+                        <a:rPr lang="en-US" sz="1200" dirty="0" err="1" smtClean="0">
+                          <a:solidFill>
+                            <a:srgbClr val="4D4D4D"/>
+                          </a:solidFill>
+                          <a:latin typeface="Andale Mono"/>
+                          <a:cs typeface="Andale Mono"/>
+                        </a:rPr>
+                        <a:t>e.preventDefault</a:t>
+                      </a:r>
+                      <a:r>
+                        <a:rPr lang="en-US" sz="1200" dirty="0" smtClean="0">
+                          <a:solidFill>
+                            <a:srgbClr val="4D4D4D"/>
+                          </a:solidFill>
+                          <a:latin typeface="Andale Mono"/>
+                          <a:cs typeface="Andale Mono"/>
+                        </a:rPr>
+                        <a:t>();</a:t>
+                      </a:r>
+                    </a:p>
+                    <a:p>
+                      <a:r>
+                        <a:rPr lang="en-US" sz="1200" dirty="0" smtClean="0">
+                          <a:solidFill>
+                            <a:srgbClr val="4D4D4D"/>
+                          </a:solidFill>
+                          <a:latin typeface="Andale Mono"/>
+                          <a:cs typeface="Andale Mono"/>
+                        </a:rPr>
+                        <a:t>     </a:t>
+                      </a:r>
+                      <a:r>
+                        <a:rPr lang="en-US" sz="1200" dirty="0" err="1" smtClean="0">
+                          <a:solidFill>
+                            <a:srgbClr val="4D4D4D"/>
+                          </a:solidFill>
+                          <a:latin typeface="Andale Mono"/>
+                          <a:cs typeface="Andale Mono"/>
+                        </a:rPr>
+                        <a:t>numbers.sort</a:t>
+                      </a:r>
+                      <a:r>
+                        <a:rPr lang="en-US" sz="1200" dirty="0" smtClean="0">
+                          <a:solidFill>
+                            <a:srgbClr val="4D4D4D"/>
+                          </a:solidFill>
+                          <a:latin typeface="Andale Mono"/>
+                          <a:cs typeface="Andale Mono"/>
+                        </a:rPr>
+                        <a:t>();</a:t>
+                      </a:r>
+                    </a:p>
+                    <a:p>
+                      <a:r>
+                        <a:rPr lang="en-US" sz="1200" dirty="0" smtClean="0">
+                          <a:solidFill>
+                            <a:srgbClr val="4D4D4D"/>
+                          </a:solidFill>
+                          <a:latin typeface="Andale Mono"/>
+                          <a:cs typeface="Andale Mono"/>
+                        </a:rPr>
+                        <a:t>};</a:t>
+                      </a:r>
+                    </a:p>
+                    <a:p>
+                      <a:r>
+                        <a:rPr lang="en-US" sz="1200" dirty="0" smtClean="0">
+                          <a:solidFill>
+                            <a:srgbClr val="4D4D4D"/>
+                          </a:solidFill>
+                          <a:latin typeface="Andale Mono"/>
+                          <a:cs typeface="Andale Mono"/>
+                        </a:rPr>
+                        <a:t>$(‘</a:t>
+                      </a:r>
+                      <a:r>
+                        <a:rPr lang="en-US" sz="1200" dirty="0" err="1" smtClean="0">
+                          <a:solidFill>
+                            <a:srgbClr val="4D4D4D"/>
+                          </a:solidFill>
+                          <a:latin typeface="Andale Mono"/>
+                          <a:cs typeface="Andale Mono"/>
+                        </a:rPr>
+                        <a:t>a.sort</a:t>
+                      </a:r>
+                      <a:r>
+                        <a:rPr lang="en-US" sz="1200" dirty="0" smtClean="0">
+                          <a:solidFill>
+                            <a:srgbClr val="4D4D4D"/>
+                          </a:solidFill>
+                          <a:latin typeface="Andale Mono"/>
+                          <a:cs typeface="Andale Mono"/>
+                        </a:rPr>
+                        <a:t>-numbers’).on(‘click’, </a:t>
+                      </a:r>
+                      <a:r>
+                        <a:rPr lang="en-US" sz="1200" dirty="0" err="1" smtClean="0">
+                          <a:solidFill>
+                            <a:srgbClr val="4D4D4D"/>
+                          </a:solidFill>
+                          <a:latin typeface="Andale Mono"/>
+                          <a:cs typeface="Andale Mono"/>
+                        </a:rPr>
+                        <a:t>sortNumbers</a:t>
+                      </a:r>
+                      <a:r>
+                        <a:rPr lang="en-US" sz="1200" dirty="0" smtClean="0">
+                          <a:solidFill>
+                            <a:srgbClr val="4D4D4D"/>
+                          </a:solidFill>
+                          <a:latin typeface="Andale Mono"/>
+                          <a:cs typeface="Andale Mono"/>
+                        </a:rPr>
+                        <a:t>);</a:t>
+                      </a:r>
+                      <a:endParaRPr lang="en-US" sz="1200" dirty="0">
+                        <a:solidFill>
+                          <a:srgbClr val="4D4D4D"/>
+                        </a:solidFill>
+                        <a:latin typeface="Andale Mono"/>
+                        <a:cs typeface="Andale Mono"/>
+                      </a:endParaRPr>
+                    </a:p>
+                  </a:txBody>
+                  <a:tcPr>
+                    <a:lnL>
+                      <a:noFill/>
+                    </a:lnL>
+                    <a:lnR>
+                      <a:noFill/>
+                    </a:lnR>
+                    <a:lnT w="12700" cmpd="sng">
+                      <a:noFill/>
+                    </a:lnT>
+                    <a:lnB w="12700" cmpd="sng">
+                      <a:noFill/>
+                    </a:lnB>
+                    <a:lnTlToBr w="12700" cmpd="sng">
+                      <a:noFill/>
+                      <a:prstDash val="solid"/>
+                    </a:lnTlToBr>
+                    <a:lnBlToTr w="12700" cmpd="sng">
+                      <a:noFill/>
+                      <a:prstDash val="solid"/>
+                    </a:lnBlToTr>
+                  </a:tcPr>
+                </a:tc>
+              </a:tr>
+            </a:tbl>
+          </a:graphicData>
+        </a:graphic>
+      </p:graphicFrame>
     </p:spTree>
     <p:extLst>
       <p:ext uri="{BB962C8B-B14F-4D97-AF65-F5344CB8AC3E}">
@@ -8620,11 +9119,12 @@
             <a:pPr lvl="1" algn="just"/>
             <a:r>
               <a:rPr lang="en-GB" sz="1800" dirty="0"/>
-              <a:t>Avoid functions that do too much and mix deferent features in one lump, best practice would be to separate these features. A function that handles setup, presentation, Ajax calls and clean up all in one block is a recipe for bugs</a:t>
-            </a:r>
-            <a:br>
-              <a:rPr lang="en-GB" sz="1800" dirty="0"/>
-            </a:br>
+              <a:t>Avoid functions that do too much and mix deferent features in one lump, best practice would be to separate these features. A function that handles setup, presentation, Ajax calls and clean up all in one block is a recipe for </a:t>
+            </a:r>
+            <a:r>
+              <a:rPr lang="en-GB" sz="1800" dirty="0" smtClean="0"/>
+              <a:t>bugs</a:t>
+            </a:r>
             <a:endParaRPr lang="en-GB" sz="1800" dirty="0"/>
           </a:p>
           <a:p>
@@ -8654,7 +9154,21 @@
                 <a:latin typeface="Apple Symbols"/>
                 <a:cs typeface="Apple Symbols"/>
               </a:rPr>
-              <a:t>     //-- free floating functions</a:t>
+              <a:t>     //-- private functions</a:t>
+            </a:r>
+            <a:r>
+              <a:rPr lang="en-GB" sz="1800" dirty="0">
+                <a:latin typeface="Apple Symbols"/>
+                <a:cs typeface="Apple Symbols"/>
+              </a:rPr>
+              <a:t> </a:t>
+            </a:r>
+            <a:r>
+              <a:rPr lang="en-GB" sz="1800" dirty="0" smtClean="0">
+                <a:latin typeface="Apple Symbols"/>
+                <a:cs typeface="Apple Symbols"/>
+              </a:rPr>
+              <a:t>here    </a:t>
             </a:r>
             <a:br>
               <a:rPr lang="en-GB" sz="1800" dirty="0" smtClean="0">
@@ -8674,28 +9188,28 @@
                 <a:latin typeface="Apple Symbols"/>
                 <a:cs typeface="Apple Symbols"/>
               </a:rPr>
-              <a:t>global.mymodule</a:t>
+              <a:t>global.MyModule</a:t>
             </a:r>
             <a:r>
               <a:rPr lang="en-GB" sz="1800" dirty="0" smtClean="0">
                 <a:latin typeface="Apple Symbols"/>
                 <a:cs typeface="Apple Symbols"/>
               </a:rPr>
-              <a:t> = {    // all your stuff here</a:t>
-            </a:r>
-            <a:r>
-              <a:rPr lang="en-GB" sz="1800" dirty="0">
+              <a:t> = {    //assessor methods </a:t>
+            </a:r>
+            <a:r>
+              <a:rPr lang="en-GB" sz="1800" dirty="0" err="1" smtClean="0">
                 <a:latin typeface="Apple Symbols"/>
                 <a:cs typeface="Apple Symbols"/>
               </a:rPr>
-              <a:t> </a:t>
+              <a:t>etc</a:t>
             </a:r>
             <a:r>
               <a:rPr lang="en-GB" sz="1800" dirty="0" smtClean="0">
                 <a:latin typeface="Apple Symbols"/>
                 <a:cs typeface="Apple Symbols"/>
               </a:rPr>
-              <a:t> };</a:t>
+              <a:t>}; //making it accessible externally </a:t>
             </a:r>
             <a:br>
               <a:rPr lang="en-GB" sz="1800" dirty="0" smtClean="0">
@@ -9209,8 +9723,33 @@
             <a:pPr lvl="1" algn="just"/>
             <a:r>
               <a:rPr lang="en-GB" sz="1800" dirty="0"/>
-              <a:t>Download or clone repository</a:t>
-            </a:r>
+              <a:t>Download or clone </a:t>
+            </a:r>
+            <a:r>
+              <a:rPr lang="en-GB" sz="1800" dirty="0" smtClean="0"/>
+              <a:t>repository - </a:t>
+            </a:r>
+            <a:r>
+              <a:rPr lang="en-GB" sz="1600" dirty="0" err="1"/>
+              <a:t>github.com</a:t>
+            </a:r>
+            <a:r>
+              <a:rPr lang="en-GB" sz="1600" dirty="0"/>
+              <a:t>/</a:t>
+            </a:r>
+            <a:r>
+              <a:rPr lang="en-GB" sz="1600" dirty="0" err="1"/>
+              <a:t>madjava</a:t>
+            </a:r>
+            <a:r>
+              <a:rPr lang="en-GB" sz="1600" dirty="0"/>
+              <a:t>/</a:t>
+            </a:r>
+            <a:r>
+              <a:rPr lang="en-GB" sz="1600" dirty="0" err="1" smtClean="0"/>
+              <a:t>unconf</a:t>
+            </a:r>
+            <a:endParaRPr lang="en-GB" sz="1600" dirty="0"/>
           </a:p>
           <a:p>
             <a:pPr lvl="1" algn="just"/>
@@ -10697,8 +11236,12 @@
           <a:p>
             <a:pPr lvl="1"/>
             <a:r>
+              <a:rPr lang="en-US" sz="3000" dirty="0" smtClean="0"/>
+              <a:t>JavaScript Unit </a:t>
+            </a:r>
+            <a:r>
               <a:rPr lang="en-US" sz="3000" dirty="0"/>
-              <a:t>Unit T</a:t>
+              <a:t>T</a:t>
             </a:r>
             <a:r>
               <a:rPr lang="en-US" sz="3000" dirty="0" smtClean="0"/>
@@ -11005,7 +11548,7 @@
           <a:p>
             <a:r>
               <a:rPr lang="en-US" dirty="0" smtClean="0"/>
-              <a:t>Our Agenda for the session</a:t>
+              <a:t>Introduction to TDD / BDD</a:t>
             </a:r>
             <a:endParaRPr lang="en-US" dirty="0"/>
           </a:p>
@@ -11644,7 +12187,11 @@
           <a:p>
             <a:r>
               <a:rPr lang="en-US" dirty="0" smtClean="0"/>
-              <a:t>Unit Testing challenges</a:t>
+              <a:t>Unit Testing </a:t>
+            </a:r>
+            <a:r>
+              <a:rPr lang="en-US" dirty="0" smtClean="0"/>
+              <a:t>challenges – for the JavaScript Developer</a:t>
             </a:r>
             <a:endParaRPr lang="en-US" dirty="0"/>
           </a:p>
@@ -11952,7 +12499,7 @@
             <a:pPr lvl="1"/>
             <a:r>
               <a:rPr lang="en-US" sz="3000" dirty="0" smtClean="0"/>
-              <a:t>Time to market, extra brain power needed i.e. more thought has to be given into what the developer want to achieve</a:t>
+              <a:t>Time to market, extra brain power needed i.e. more thought has to be given into what the developer wants to achieve and how each piece fits in the larger application structure</a:t>
             </a:r>
             <a:endParaRPr lang="en-US" sz="1300" i="1" dirty="0" smtClean="0"/>
           </a:p>

</xml_diff>